<commit_message>
Simple Edits for PPTX
</commit_message>
<xml_diff>
--- a/docs/1-Overview-Setup-and-Getting-Started/netcore-workshop-overview-tools.pptx
+++ b/docs/1-Overview-Setup-and-Getting-Started/netcore-workshop-overview-tools.pptx
@@ -216,10 +216,6 @@
 </p:cmAuthorLst>
 </file>
 
-<file path=ppt/revisionInfo.xml><?xml version="1.0" encoding="utf-8"?>
-<p1510:revInfo xmlns:a="http://schemas.openxmlformats.org/drawingml/2006/main" xmlns:r="http://schemas.openxmlformats.org/officeDocument/2006/relationships" xmlns:p1510="http://schemas.microsoft.com/office/powerpoint/2015/10/main"/>
-</file>
-
 <file path=ppt/handoutMasters/handoutMaster1.xml><?xml version="1.0" encoding="utf-8"?>
 <p:handoutMaster xmlns:a="http://schemas.openxmlformats.org/drawingml/2006/main" xmlns:r="http://schemas.openxmlformats.org/officeDocument/2006/relationships" xmlns:p="http://schemas.openxmlformats.org/presentationml/2006/main">
   <p:cSld>
@@ -309,7 +305,7 @@
               <a:rPr lang="en-US" smtClean="0">
                 <a:latin typeface="Segoe UI" pitchFamily="34" charset="0"/>
               </a:rPr>
-              <a:t>10/8/2017 7:21 PM</a:t>
+              <a:t>10/3/18 10:05 AM</a:t>
             </a:fld>
             <a:endParaRPr lang="en-US" dirty="0">
               <a:latin typeface="Segoe UI" pitchFamily="34" charset="0"/>
@@ -590,7 +586,7 @@
           <a:p>
             <a:fld id="{38EEC551-8CDA-4EB6-89BB-2A86C9F091C8}" type="datetime8">
               <a:rPr lang="en-US" smtClean="0"/>
-              <a:t>10/8/2017 7:19 PM</a:t>
+              <a:t>10/3/18 10:05 AM</a:t>
             </a:fld>
             <a:endParaRPr lang="en-US" dirty="0"/>
           </a:p>
@@ -1007,7 +1003,7 @@
           <a:p>
             <a:fld id="{38EEC551-8CDA-4EB6-89BB-2A86C9F091C8}" type="datetime8">
               <a:rPr lang="en-US" smtClean="0"/>
-              <a:t>10/8/2017 7:19 PM</a:t>
+              <a:t>10/3/18 10:05 AM</a:t>
             </a:fld>
             <a:endParaRPr lang="en-US" dirty="0"/>
           </a:p>
@@ -1192,7 +1188,7 @@
           <a:p>
             <a:fld id="{38EEC551-8CDA-4EB6-89BB-2A86C9F091C8}" type="datetime8">
               <a:rPr lang="en-US" smtClean="0"/>
-              <a:t>10/8/2017 7:19 PM</a:t>
+              <a:t>10/3/18 10:05 AM</a:t>
             </a:fld>
             <a:endParaRPr lang="en-US" dirty="0"/>
           </a:p>
@@ -1377,7 +1373,7 @@
           <a:p>
             <a:fld id="{38EEC551-8CDA-4EB6-89BB-2A86C9F091C8}" type="datetime8">
               <a:rPr lang="en-US" smtClean="0"/>
-              <a:t>10/8/2017 7:19 PM</a:t>
+              <a:t>10/3/18 10:05 AM</a:t>
             </a:fld>
             <a:endParaRPr lang="en-US" dirty="0"/>
           </a:p>
@@ -1562,7 +1558,7 @@
           <a:p>
             <a:fld id="{38EEC551-8CDA-4EB6-89BB-2A86C9F091C8}" type="datetime8">
               <a:rPr lang="en-US" smtClean="0"/>
-              <a:t>10/8/2017 7:19 PM</a:t>
+              <a:t>10/3/18 10:05 AM</a:t>
             </a:fld>
             <a:endParaRPr lang="en-US" dirty="0"/>
           </a:p>
@@ -1747,7 +1743,7 @@
           <a:p>
             <a:fld id="{38EEC551-8CDA-4EB6-89BB-2A86C9F091C8}" type="datetime8">
               <a:rPr lang="en-US" smtClean="0"/>
-              <a:t>10/8/2017 7:19 PM</a:t>
+              <a:t>10/3/18 10:05 AM</a:t>
             </a:fld>
             <a:endParaRPr lang="en-US" dirty="0"/>
           </a:p>
@@ -1932,7 +1928,7 @@
           <a:p>
             <a:fld id="{38EEC551-8CDA-4EB6-89BB-2A86C9F091C8}" type="datetime8">
               <a:rPr lang="en-US" smtClean="0"/>
-              <a:t>10/8/2017 7:19 PM</a:t>
+              <a:t>10/3/18 10:05 AM</a:t>
             </a:fld>
             <a:endParaRPr lang="en-US" dirty="0"/>
           </a:p>
@@ -2117,7 +2113,7 @@
           <a:p>
             <a:fld id="{38EEC551-8CDA-4EB6-89BB-2A86C9F091C8}" type="datetime8">
               <a:rPr lang="en-US" smtClean="0"/>
-              <a:t>10/8/2017 7:19 PM</a:t>
+              <a:t>10/3/18 10:05 AM</a:t>
             </a:fld>
             <a:endParaRPr lang="en-US" dirty="0"/>
           </a:p>
@@ -2302,7 +2298,7 @@
           <a:p>
             <a:fld id="{38EEC551-8CDA-4EB6-89BB-2A86C9F091C8}" type="datetime8">
               <a:rPr lang="en-US" smtClean="0"/>
-              <a:t>10/8/2017 7:19 PM</a:t>
+              <a:t>10/3/18 10:05 AM</a:t>
             </a:fld>
             <a:endParaRPr lang="en-US" dirty="0"/>
           </a:p>
@@ -2487,7 +2483,7 @@
           <a:p>
             <a:fld id="{38EEC551-8CDA-4EB6-89BB-2A86C9F091C8}" type="datetime8">
               <a:rPr lang="en-US" smtClean="0"/>
-              <a:t>10/8/2017 7:19 PM</a:t>
+              <a:t>10/3/18 10:05 AM</a:t>
             </a:fld>
             <a:endParaRPr lang="en-US" dirty="0"/>
           </a:p>
@@ -2979,7 +2975,7 @@
                 <a:tabLst/>
                 <a:defRPr/>
               </a:pPr>
-              <a:t>10/8/2017 7:19 PM</a:t>
+              <a:t>10/3/18 10:05 AM</a:t>
             </a:fld>
             <a:endParaRPr kumimoji="0" lang="en-US" sz="1200" b="0" i="0" u="none" strike="noStrike" kern="1200" cap="none" spc="0" normalizeH="0" baseline="0" noProof="0" dirty="0">
               <a:ln>
@@ -3303,7 +3299,7 @@
           <a:p>
             <a:fld id="{7D10C09F-FCA1-48C8-B40D-42E1045D109E}" type="datetime8">
               <a:rPr lang="en-US" smtClean="0"/>
-              <a:t>10/8/2017 7:19 PM</a:t>
+              <a:t>10/3/18 10:05 AM</a:t>
             </a:fld>
             <a:endParaRPr lang="en-US" dirty="0"/>
           </a:p>
@@ -3435,7 +3431,7 @@
           <a:p>
             <a:fld id="{6108602D-D426-4C00-B215-BFA18C076426}" type="datetime8">
               <a:rPr lang="en-US" smtClean="0"/>
-              <a:t>10/8/2017 7:19 PM</a:t>
+              <a:t>10/3/18 10:05 AM</a:t>
             </a:fld>
             <a:endParaRPr lang="en-US" dirty="0"/>
           </a:p>
@@ -3648,7 +3644,7 @@
           <a:p>
             <a:fld id="{6108602D-D426-4C00-B215-BFA18C076426}" type="datetime8">
               <a:rPr lang="en-US" smtClean="0"/>
-              <a:t>10/8/2017 7:19 PM</a:t>
+              <a:t>10/3/18 10:05 AM</a:t>
             </a:fld>
             <a:endParaRPr lang="en-US" dirty="0"/>
           </a:p>
@@ -3890,7 +3886,7 @@
           <a:p>
             <a:fld id="{6108602D-D426-4C00-B215-BFA18C076426}" type="datetime8">
               <a:rPr lang="en-US" smtClean="0"/>
-              <a:t>10/8/2017 7:19 PM</a:t>
+              <a:t>10/3/18 10:05 AM</a:t>
             </a:fld>
             <a:endParaRPr lang="en-US" dirty="0"/>
           </a:p>
@@ -4088,7 +4084,7 @@
           <a:p>
             <a:fld id="{7D10C09F-FCA1-48C8-B40D-42E1045D109E}" type="datetime8">
               <a:rPr lang="en-US" smtClean="0"/>
-              <a:t>10/8/2017 7:19 PM</a:t>
+              <a:t>10/3/18 10:05 AM</a:t>
             </a:fld>
             <a:endParaRPr lang="en-US" dirty="0"/>
           </a:p>
@@ -4273,7 +4269,7 @@
           <a:p>
             <a:fld id="{38EEC551-8CDA-4EB6-89BB-2A86C9F091C8}" type="datetime8">
               <a:rPr lang="en-US" smtClean="0"/>
-              <a:t>10/8/2017 7:19 PM</a:t>
+              <a:t>10/3/18 10:05 AM</a:t>
             </a:fld>
             <a:endParaRPr lang="en-US" dirty="0"/>
           </a:p>
@@ -4458,7 +4454,7 @@
           <a:p>
             <a:fld id="{38EEC551-8CDA-4EB6-89BB-2A86C9F091C8}" type="datetime8">
               <a:rPr lang="en-US" smtClean="0"/>
-              <a:t>10/8/2017 7:19 PM</a:t>
+              <a:t>10/3/18 10:05 AM</a:t>
             </a:fld>
             <a:endParaRPr lang="en-US" dirty="0"/>
           </a:p>
@@ -4620,7 +4616,7 @@
           <a:p>
             <a:fld id="{E74353ED-ACB2-44BF-A903-985B0AF962B7}" type="datetime1">
               <a:rPr lang="en-US" smtClean="0"/>
-              <a:t>10/8/2017</a:t>
+              <a:t>10/3/18</a:t>
             </a:fld>
             <a:endParaRPr lang="en-US" dirty="0"/>
           </a:p>
@@ -4752,7 +4748,7 @@
           <a:p>
             <a:fld id="{6108602D-D426-4C00-B215-BFA18C076426}" type="datetime8">
               <a:rPr lang="en-US" smtClean="0"/>
-              <a:t>10/8/2017 7:19 PM</a:t>
+              <a:t>10/3/18 10:05 AM</a:t>
             </a:fld>
             <a:endParaRPr lang="en-US" dirty="0"/>
           </a:p>
@@ -5049,7 +5045,7 @@
                 <a:tabLst/>
                 <a:defRPr/>
               </a:pPr>
-              <a:t>10/8/2017 7:19 PM</a:t>
+              <a:t>10/3/18 10:05 AM</a:t>
             </a:fld>
             <a:endParaRPr kumimoji="0" lang="en-US" sz="1200" b="0" i="0" u="none" strike="noStrike" kern="1200" cap="none" spc="0" normalizeH="0" baseline="0" noProof="0" dirty="0">
               <a:ln>
@@ -5253,7 +5249,7 @@
           <a:p>
             <a:fld id="{6108602D-D426-4C00-B215-BFA18C076426}" type="datetime8">
               <a:rPr lang="en-US" smtClean="0"/>
-              <a:t>10/8/2017 7:19 PM</a:t>
+              <a:t>10/3/18 10:05 AM</a:t>
             </a:fld>
             <a:endParaRPr lang="en-US" dirty="0"/>
           </a:p>
@@ -5843,7 +5839,7 @@
                 <a:tabLst/>
                 <a:defRPr/>
               </a:pPr>
-              <a:t>10/8/2017 7:23 PM</a:t>
+              <a:t>10/3/18 10:05 AM</a:t>
             </a:fld>
             <a:endParaRPr kumimoji="0" lang="en-US" sz="1200" b="0" i="0" u="none" strike="noStrike" kern="1200" cap="none" spc="0" normalizeH="0" baseline="0" noProof="0" dirty="0">
               <a:ln>
@@ -6103,7 +6099,7 @@
           <a:p>
             <a:fld id="{38EEC551-8CDA-4EB6-89BB-2A86C9F091C8}" type="datetime8">
               <a:rPr lang="en-US" smtClean="0"/>
-              <a:t>10/8/2017 7:19 PM</a:t>
+              <a:t>10/3/18 10:05 AM</a:t>
             </a:fld>
             <a:endParaRPr lang="en-US" dirty="0"/>
           </a:p>
@@ -6415,7 +6411,7 @@
           <a:p>
             <a:fld id="{38EEC551-8CDA-4EB6-89BB-2A86C9F091C8}" type="datetime8">
               <a:rPr lang="en-US" smtClean="0"/>
-              <a:t>10/8/2017 7:19 PM</a:t>
+              <a:t>10/3/18 10:05 AM</a:t>
             </a:fld>
             <a:endParaRPr lang="en-US" dirty="0"/>
           </a:p>
@@ -6679,7 +6675,7 @@
                 <a:tabLst/>
                 <a:defRPr/>
               </a:pPr>
-              <a:t>10/8/2017 7:19 PM</a:t>
+              <a:t>10/3/18 10:05 AM</a:t>
             </a:fld>
             <a:endParaRPr kumimoji="0" lang="en-US" sz="1200" b="0" i="0" u="none" strike="noStrike" kern="1200" cap="none" spc="0" normalizeH="0" baseline="0" noProof="0" dirty="0">
               <a:ln>
@@ -6936,7 +6932,7 @@
           <a:p>
             <a:fld id="{38EEC551-8CDA-4EB6-89BB-2A86C9F091C8}" type="datetime8">
               <a:rPr lang="en-US" smtClean="0"/>
-              <a:t>10/8/2017 7:19 PM</a:t>
+              <a:t>10/3/18 10:05 AM</a:t>
             </a:fld>
             <a:endParaRPr lang="en-US" dirty="0"/>
           </a:p>
@@ -7200,7 +7196,7 @@
                 <a:tabLst/>
                 <a:defRPr/>
               </a:pPr>
-              <a:t>10/8/2017 7:19 PM</a:t>
+              <a:t>10/3/18 10:05 AM</a:t>
             </a:fld>
             <a:endParaRPr kumimoji="0" lang="en-US" sz="1200" b="0" i="0" u="none" strike="noStrike" kern="1200" cap="none" spc="0" normalizeH="0" baseline="0" noProof="0" dirty="0">
               <a:ln>
@@ -7457,7 +7453,7 @@
           <a:p>
             <a:fld id="{38EEC551-8CDA-4EB6-89BB-2A86C9F091C8}" type="datetime8">
               <a:rPr lang="en-US" smtClean="0"/>
-              <a:t>10/8/2017 7:19 PM</a:t>
+              <a:t>10/3/18 10:05 AM</a:t>
             </a:fld>
             <a:endParaRPr lang="en-US" dirty="0"/>
           </a:p>
@@ -28755,7 +28751,7 @@
                   <a:srgbClr val="00B050"/>
                 </a:solidFill>
               </a:rPr>
-              <a:t>netcoreapp2.0</a:t>
+              <a:t>netcoreapp2.1</a:t>
             </a:r>
             <a:r>
               <a:rPr lang="en-US" dirty="0"/>
@@ -28876,7 +28872,7 @@
         <p:spPr>
           <a:xfrm>
             <a:off x="274638" y="1221157"/>
-            <a:ext cx="12527207" cy="5769272"/>
+            <a:ext cx="12527207" cy="3890296"/>
           </a:xfrm>
         </p:spPr>
         <p:txBody>
@@ -28941,7 +28937,7 @@
                   <a:srgbClr val="00B050"/>
                 </a:solidFill>
               </a:rPr>
-              <a:t>netcoreapp2.0</a:t>
+              <a:t>netcoreapp2.1</a:t>
             </a:r>
             <a:r>
               <a:rPr lang="en-US" sz="2800" dirty="0"/>
@@ -28964,48 +28960,6 @@
             <a:r>
               <a:rPr lang="en-US" sz="2800" dirty="0" err="1"/>
               <a:t>PropertyGroup</a:t>
-            </a:r>
-            <a:r>
-              <a:rPr lang="en-US" sz="2800" dirty="0"/>
-              <a:t>&gt;</a:t>
-            </a:r>
-          </a:p>
-          <a:p>
-            <a:r>
-              <a:rPr lang="en-US" sz="2800" dirty="0"/>
-              <a:t>  &lt;</a:t>
-            </a:r>
-            <a:r>
-              <a:rPr lang="en-US" sz="2800" dirty="0" err="1"/>
-              <a:t>ItemGroup</a:t>
-            </a:r>
-            <a:r>
-              <a:rPr lang="en-US" sz="2800" dirty="0"/>
-              <a:t>&gt;</a:t>
-            </a:r>
-          </a:p>
-          <a:p>
-            <a:r>
-              <a:rPr lang="en-US" sz="2800" dirty="0"/>
-              <a:t>    &lt;Folder Include="</a:t>
-            </a:r>
-            <a:r>
-              <a:rPr lang="en-US" sz="2800" dirty="0" err="1"/>
-              <a:t>wwwroot</a:t>
-            </a:r>
-            <a:r>
-              <a:rPr lang="en-US" sz="2800" dirty="0"/>
-              <a:t>\" /&gt;</a:t>
-            </a:r>
-          </a:p>
-          <a:p>
-            <a:r>
-              <a:rPr lang="en-US" sz="2800" dirty="0"/>
-              <a:t>  &lt;/</a:t>
-            </a:r>
-            <a:r>
-              <a:rPr lang="en-US" sz="2800" dirty="0" err="1"/>
-              <a:t>ItemGroup</a:t>
             </a:r>
             <a:r>
               <a:rPr lang="en-US" sz="2800" dirty="0"/>
@@ -29045,11 +28999,11 @@
                   <a:srgbClr val="00B050"/>
                 </a:solidFill>
               </a:rPr>
-              <a:t>Microsoft.AspNetCore.All</a:t>
+              <a:t>Microsoft.AspNetCore.App</a:t>
             </a:r>
             <a:r>
               <a:rPr lang="en-US" sz="2800" dirty="0"/>
-              <a:t>" 	Version="2.0.0" /&gt;</a:t>
+              <a:t>" /&gt;</a:t>
             </a:r>
           </a:p>
           <a:p>
@@ -39216,6 +39170,12 @@
 </file>
 
 <file path=customXml/item1.xml><?xml version="1.0" encoding="utf-8"?>
+<p:properties xmlns:p="http://schemas.microsoft.com/office/2006/metadata/properties" xmlns:xsi="http://www.w3.org/2001/XMLSchema-instance" xmlns:pc="http://schemas.microsoft.com/office/infopath/2007/PartnerControls">
+  <documentManagement/>
+</p:properties>
+</file>
+
+<file path=customXml/item2.xml><?xml version="1.0" encoding="utf-8"?>
 <ct:contentTypeSchema xmlns:ct="http://schemas.microsoft.com/office/2006/metadata/contentType" xmlns:ma="http://schemas.microsoft.com/office/2006/metadata/properties/metaAttributes" ct:_="" ma:_="" ma:contentTypeName="Document" ma:contentTypeID="0x0101004C8AF336095DB84A94AB1A4B939C0475" ma:contentTypeVersion="4" ma:contentTypeDescription="Create a new document." ma:contentTypeScope="" ma:versionID="6f8327450122d2e4aedd139501eaa58b">
   <xsd:schema xmlns:xsd="http://www.w3.org/2001/XMLSchema" xmlns:xs="http://www.w3.org/2001/XMLSchema" xmlns:p="http://schemas.microsoft.com/office/2006/metadata/properties" xmlns:ns2="29eeffc7-3a1a-4f16-995c-1b7b58342919" targetNamespace="http://schemas.microsoft.com/office/2006/metadata/properties" ma:root="true" ma:fieldsID="7d6c3be25c216b690a82d24b3f2244b5" ns2:_="">
     <xsd:import namespace="29eeffc7-3a1a-4f16-995c-1b7b58342919"/>
@@ -39377,12 +39337,6 @@
 </ct:contentTypeSchema>
 </file>
 
-<file path=customXml/item2.xml><?xml version="1.0" encoding="utf-8"?>
-<p:properties xmlns:p="http://schemas.microsoft.com/office/2006/metadata/properties" xmlns:xsi="http://www.w3.org/2001/XMLSchema-instance" xmlns:pc="http://schemas.microsoft.com/office/infopath/2007/PartnerControls">
-  <documentManagement/>
-</p:properties>
-</file>
-
 <file path=customXml/item3.xml><?xml version="1.0" encoding="utf-8"?>
 <?mso-contentType ?>
 <FormTemplates xmlns="http://schemas.microsoft.com/sharepoint/v3/contenttype/forms">
@@ -39393,6 +39347,22 @@
 </file>
 
 <file path=customXml/itemProps1.xml><?xml version="1.0" encoding="utf-8"?>
+<ds:datastoreItem xmlns:ds="http://schemas.openxmlformats.org/officeDocument/2006/customXml" ds:itemID="{F990F116-B58F-4255-B05B-DA3808E0E5C6}">
+  <ds:schemaRefs>
+    <ds:schemaRef ds:uri="http://schemas.microsoft.com/office/2006/metadata/properties"/>
+    <ds:schemaRef ds:uri="http://purl.org/dc/terms/"/>
+    <ds:schemaRef ds:uri="http://schemas.microsoft.com/office/2006/documentManagement/types"/>
+    <ds:schemaRef ds:uri="http://schemas.microsoft.com/office/infopath/2007/PartnerControls"/>
+    <ds:schemaRef ds:uri="http://www.w3.org/XML/1998/namespace"/>
+    <ds:schemaRef ds:uri="http://purl.org/dc/dcmitype/"/>
+    <ds:schemaRef ds:uri="http://schemas.openxmlformats.org/package/2006/metadata/core-properties"/>
+    <ds:schemaRef ds:uri="29eeffc7-3a1a-4f16-995c-1b7b58342919"/>
+    <ds:schemaRef ds:uri="http://purl.org/dc/elements/1.1/"/>
+  </ds:schemaRefs>
+</ds:datastoreItem>
+</file>
+
+<file path=customXml/itemProps2.xml><?xml version="1.0" encoding="utf-8"?>
 <ds:datastoreItem xmlns:ds="http://schemas.openxmlformats.org/officeDocument/2006/customXml" ds:itemID="{4C47C6CA-B255-4F53-A8A9-1A4E6D0653D8}">
   <ds:schemaRefs>
     <ds:schemaRef ds:uri="http://schemas.microsoft.com/office/2006/metadata/contentType"/>
@@ -39410,22 +39380,6 @@
 </ds:datastoreItem>
 </file>
 
-<file path=customXml/itemProps2.xml><?xml version="1.0" encoding="utf-8"?>
-<ds:datastoreItem xmlns:ds="http://schemas.openxmlformats.org/officeDocument/2006/customXml" ds:itemID="{F990F116-B58F-4255-B05B-DA3808E0E5C6}">
-  <ds:schemaRefs>
-    <ds:schemaRef ds:uri="http://schemas.microsoft.com/office/2006/metadata/properties"/>
-    <ds:schemaRef ds:uri="http://purl.org/dc/terms/"/>
-    <ds:schemaRef ds:uri="http://schemas.microsoft.com/office/2006/documentManagement/types"/>
-    <ds:schemaRef ds:uri="http://schemas.microsoft.com/office/infopath/2007/PartnerControls"/>
-    <ds:schemaRef ds:uri="http://www.w3.org/XML/1998/namespace"/>
-    <ds:schemaRef ds:uri="http://purl.org/dc/dcmitype/"/>
-    <ds:schemaRef ds:uri="http://schemas.openxmlformats.org/package/2006/metadata/core-properties"/>
-    <ds:schemaRef ds:uri="29eeffc7-3a1a-4f16-995c-1b7b58342919"/>
-    <ds:schemaRef ds:uri="http://purl.org/dc/elements/1.1/"/>
-  </ds:schemaRefs>
-</ds:datastoreItem>
-</file>
-
 <file path=customXml/itemProps3.xml><?xml version="1.0" encoding="utf-8"?>
 <ds:datastoreItem xmlns:ds="http://schemas.openxmlformats.org/officeDocument/2006/customXml" ds:itemID="{758FDAC0-319D-4A54-8D8E-1D42CB1F8004}">
   <ds:schemaRefs>

</xml_diff>